<commit_message>
day 27 and 28 content updated
</commit_message>
<xml_diff>
--- a/Day28/DockerAndKubernetes_Training-Day28.pptx
+++ b/Day28/DockerAndKubernetes_Training-Day28.pptx
@@ -13660,7 +13660,7 @@
           <a:p>
             <a:r>
               <a:rPr lang="en-US" sz="4800" b="1" i="1" dirty="0"/>
-              <a:t>DAY 26</a:t>
+              <a:t>DAY 28</a:t>
             </a:r>
             <a:endParaRPr lang="en-IN" sz="4800" b="1" i="1" dirty="0"/>
           </a:p>
@@ -14037,72 +14037,38 @@
           <a:p>
             <a:r>
               <a:rPr lang="en-US" dirty="0"/>
-              <a:t>Any Queries from previous session</a:t>
+              <a:t>Replication controller and replica set</a:t>
             </a:r>
           </a:p>
           <a:p>
-            <a:pPr lvl="1">
-              <a:buFont typeface="Wingdings" panose="05000000000000000000" pitchFamily="2" charset="2"/>
-              <a:buChar char="Ø"/>
-            </a:pPr>
+            <a:pPr lvl="1"/>
             <a:r>
               <a:rPr lang="en-US" dirty="0"/>
-              <a:t>Multi-container deployment, one for web application and second for data pull</a:t>
+              <a:t>Demo with replication controller</a:t>
             </a:r>
           </a:p>
           <a:p>
-            <a:pPr lvl="1">
-              <a:buFont typeface="Wingdings" panose="05000000000000000000" pitchFamily="2" charset="2"/>
-              <a:buChar char="Ø"/>
-            </a:pPr>
+            <a:pPr lvl="1"/>
             <a:r>
               <a:rPr lang="en-US" dirty="0"/>
-              <a:t>POD creation with </a:t>
+              <a:t>Demo with replica set</a:t>
             </a:r>
-            <a:r>
-              <a:rPr lang="en-US" dirty="0" err="1"/>
-              <a:t>init</a:t>
-            </a:r>
+          </a:p>
+          <a:p>
             <a:r>
               <a:rPr lang="en-US" dirty="0"/>
-              <a:t> Container advantages for pre-request</a:t>
+              <a:t>Deployment Set description</a:t>
             </a:r>
           </a:p>
           <a:p>
-            <a:pPr lvl="1">
-              <a:buFont typeface="Wingdings" panose="05000000000000000000" pitchFamily="2" charset="2"/>
-              <a:buChar char="Ø"/>
-            </a:pPr>
+            <a:pPr lvl="1"/>
             <a:r>
               <a:rPr lang="en-US" dirty="0"/>
-              <a:t>static POD deployment</a:t>
+              <a:t>Demo with Deployment Set</a:t>
             </a:r>
           </a:p>
           <a:p>
-            <a:pPr lvl="1">
-              <a:buFont typeface="Wingdings" panose="05000000000000000000" pitchFamily="2" charset="2"/>
-              <a:buChar char="Ø"/>
-            </a:pPr>
-            <a:r>
-              <a:rPr lang="en-US" dirty="0"/>
-              <a:t>resource allocation like CPU and MEMORY</a:t>
-            </a:r>
-          </a:p>
-          <a:p>
-            <a:pPr lvl="1">
-              <a:buFont typeface="Wingdings" panose="05000000000000000000" pitchFamily="2" charset="2"/>
-              <a:buChar char="Ø"/>
-            </a:pPr>
-            <a:r>
-              <a:rPr lang="en-US" dirty="0"/>
-              <a:t>Replication controller and replica set</a:t>
-            </a:r>
-          </a:p>
-          <a:p>
-            <a:pPr marL="457200" lvl="1" indent="0">
-              <a:buNone/>
-            </a:pPr>
-            <a:endParaRPr lang="en-US" sz="1800" dirty="0"/>
+            <a:endParaRPr lang="en-US" dirty="0"/>
           </a:p>
           <a:p>
             <a:pPr marL="914400" lvl="2" indent="0">
@@ -14243,35 +14209,38 @@
           <a:p>
             <a:r>
               <a:rPr lang="en-US" dirty="0"/>
-              <a:t>POD – Artifact</a:t>
+              <a:t>Refer resources and artifacts from k8s-resources</a:t>
             </a:r>
           </a:p>
           <a:p>
-            <a:pPr lvl="1"/>
+            <a:pPr lvl="1">
+              <a:buFont typeface="Wingdings" panose="05000000000000000000" pitchFamily="2" charset="2"/>
+              <a:buChar char="Ø"/>
+            </a:pPr>
             <a:r>
               <a:rPr lang="en-US" dirty="0"/>
-              <a:t>Refer agenda items</a:t>
+              <a:t>Replication Controller</a:t>
             </a:r>
           </a:p>
           <a:p>
-            <a:pPr lvl="1"/>
+            <a:pPr lvl="1">
+              <a:buFont typeface="Wingdings" panose="05000000000000000000" pitchFamily="2" charset="2"/>
+              <a:buChar char="Ø"/>
+            </a:pPr>
             <a:r>
               <a:rPr lang="en-US" dirty="0"/>
-              <a:t>Refer PODs folder for all </a:t>
+              <a:t>Replica Set</a:t>
             </a:r>
-            <a:r>
-              <a:rPr lang="en-US" dirty="0" err="1"/>
-              <a:t>yaml</a:t>
-            </a:r>
+          </a:p>
+          <a:p>
+            <a:pPr lvl="1">
+              <a:buFont typeface="Wingdings" panose="05000000000000000000" pitchFamily="2" charset="2"/>
+              <a:buChar char="Ø"/>
+            </a:pPr>
             <a:r>
               <a:rPr lang="en-US" dirty="0"/>
-              <a:t> </a:t>
+              <a:t>Deployment Set</a:t>
             </a:r>
-            <a:r>
-              <a:rPr lang="en-US"/>
-              <a:t>related details</a:t>
-            </a:r>
-            <a:endParaRPr lang="en-US" dirty="0"/>
           </a:p>
         </p:txBody>
       </p:sp>

</xml_diff>

<commit_message>
testing folder with index.html
</commit_message>
<xml_diff>
--- a/Day28/DockerAndKubernetes_Training-Day28.pptx
+++ b/Day28/DockerAndKubernetes_Training-Day28.pptx
@@ -199,7 +199,7 @@
           <a:p>
             <a:fld id="{B09F413D-6E72-4B8A-80ED-A580F7C91B71}" type="datetimeFigureOut">
               <a:rPr lang="en-IN" smtClean="0"/>
-              <a:t>11-05-2023</a:t>
+              <a:t>12-05-2023</a:t>
             </a:fld>
             <a:endParaRPr lang="en-IN"/>
           </a:p>
@@ -802,7 +802,7 @@
           <a:p>
             <a:fld id="{12E8600E-B0EE-4521-BF40-4B72FBA06775}" type="datetimeFigureOut">
               <a:rPr lang="en-IN" smtClean="0"/>
-              <a:t>11-05-2023</a:t>
+              <a:t>12-05-2023</a:t>
             </a:fld>
             <a:endParaRPr lang="en-IN"/>
           </a:p>
@@ -1891,7 +1891,7 @@
             <a:fld id="{49F3E739-D457-46E5-B626-C9B182A007EE}" type="datetimeFigureOut">
               <a:rPr lang="en-US" smtClean="0"/>
               <a:pPr/>
-              <a:t>5/11/2023</a:t>
+              <a:t>5/12/2023</a:t>
             </a:fld>
             <a:endParaRPr lang="en-US"/>
           </a:p>
@@ -2873,7 +2873,7 @@
             <a:fld id="{49F3E739-D457-46E5-B626-C9B182A007EE}" type="datetimeFigureOut">
               <a:rPr lang="en-US" smtClean="0"/>
               <a:pPr/>
-              <a:t>5/11/2023</a:t>
+              <a:t>5/12/2023</a:t>
             </a:fld>
             <a:endParaRPr lang="en-US"/>
           </a:p>
@@ -4009,7 +4009,7 @@
             <a:fld id="{49F3E739-D457-46E5-B626-C9B182A007EE}" type="datetimeFigureOut">
               <a:rPr lang="en-US" smtClean="0"/>
               <a:pPr/>
-              <a:t>5/11/2023</a:t>
+              <a:t>5/12/2023</a:t>
             </a:fld>
             <a:endParaRPr lang="en-US"/>
           </a:p>
@@ -5044,7 +5044,7 @@
             <a:fld id="{49F3E739-D457-46E5-B626-C9B182A007EE}" type="datetimeFigureOut">
               <a:rPr lang="en-US" smtClean="0"/>
               <a:pPr/>
-              <a:t>5/11/2023</a:t>
+              <a:t>5/12/2023</a:t>
             </a:fld>
             <a:endParaRPr lang="en-US"/>
           </a:p>
@@ -5706,7 +5706,7 @@
             <a:fld id="{49F3E739-D457-46E5-B626-C9B182A007EE}" type="datetimeFigureOut">
               <a:rPr lang="en-US" smtClean="0"/>
               <a:pPr/>
-              <a:t>5/11/2023</a:t>
+              <a:t>5/12/2023</a:t>
             </a:fld>
             <a:endParaRPr lang="en-US"/>
           </a:p>
@@ -6569,7 +6569,7 @@
             <a:fld id="{49F3E739-D457-46E5-B626-C9B182A007EE}" type="datetimeFigureOut">
               <a:rPr lang="en-US" smtClean="0"/>
               <a:pPr/>
-              <a:t>5/11/2023</a:t>
+              <a:t>5/12/2023</a:t>
             </a:fld>
             <a:endParaRPr lang="en-US"/>
           </a:p>
@@ -6760,7 +6760,7 @@
           <a:p>
             <a:fld id="{12E8600E-B0EE-4521-BF40-4B72FBA06775}" type="datetimeFigureOut">
               <a:rPr lang="en-IN" smtClean="0"/>
-              <a:t>11-05-2023</a:t>
+              <a:t>12-05-2023</a:t>
             </a:fld>
             <a:endParaRPr lang="en-IN"/>
           </a:p>
@@ -7732,7 +7732,7 @@
           <a:p>
             <a:fld id="{12E8600E-B0EE-4521-BF40-4B72FBA06775}" type="datetimeFigureOut">
               <a:rPr lang="en-IN" smtClean="0"/>
-              <a:t>11-05-2023</a:t>
+              <a:t>12-05-2023</a:t>
             </a:fld>
             <a:endParaRPr lang="en-IN"/>
           </a:p>
@@ -7943,7 +7943,7 @@
           <a:p>
             <a:fld id="{12E8600E-B0EE-4521-BF40-4B72FBA06775}" type="datetimeFigureOut">
               <a:rPr lang="en-IN" smtClean="0"/>
-              <a:t>11-05-2023</a:t>
+              <a:t>12-05-2023</a:t>
             </a:fld>
             <a:endParaRPr lang="en-IN"/>
           </a:p>
@@ -8977,7 +8977,7 @@
           <a:p>
             <a:fld id="{12E8600E-B0EE-4521-BF40-4B72FBA06775}" type="datetimeFigureOut">
               <a:rPr lang="en-IN" smtClean="0"/>
-              <a:t>11-05-2023</a:t>
+              <a:t>12-05-2023</a:t>
             </a:fld>
             <a:endParaRPr lang="en-IN"/>
           </a:p>
@@ -9249,7 +9249,7 @@
           <a:p>
             <a:fld id="{12E8600E-B0EE-4521-BF40-4B72FBA06775}" type="datetimeFigureOut">
               <a:rPr lang="en-IN" smtClean="0"/>
-              <a:t>11-05-2023</a:t>
+              <a:t>12-05-2023</a:t>
             </a:fld>
             <a:endParaRPr lang="en-IN"/>
           </a:p>
@@ -9660,7 +9660,7 @@
             <a:fld id="{49F3E739-D457-46E5-B626-C9B182A007EE}" type="datetimeFigureOut">
               <a:rPr lang="en-US" smtClean="0"/>
               <a:pPr/>
-              <a:t>5/11/2023</a:t>
+              <a:t>5/12/2023</a:t>
             </a:fld>
             <a:endParaRPr lang="en-US"/>
           </a:p>
@@ -9788,7 +9788,7 @@
           <a:p>
             <a:fld id="{12E8600E-B0EE-4521-BF40-4B72FBA06775}" type="datetimeFigureOut">
               <a:rPr lang="en-IN" smtClean="0"/>
-              <a:t>11-05-2023</a:t>
+              <a:t>12-05-2023</a:t>
             </a:fld>
             <a:endParaRPr lang="en-IN"/>
           </a:p>
@@ -9883,7 +9883,7 @@
           <a:p>
             <a:fld id="{12E8600E-B0EE-4521-BF40-4B72FBA06775}" type="datetimeFigureOut">
               <a:rPr lang="en-IN" smtClean="0"/>
-              <a:t>11-05-2023</a:t>
+              <a:t>12-05-2023</a:t>
             </a:fld>
             <a:endParaRPr lang="en-IN"/>
           </a:p>
@@ -10964,7 +10964,7 @@
           <a:p>
             <a:fld id="{12E8600E-B0EE-4521-BF40-4B72FBA06775}" type="datetimeFigureOut">
               <a:rPr lang="en-IN" smtClean="0"/>
-              <a:t>11-05-2023</a:t>
+              <a:t>12-05-2023</a:t>
             </a:fld>
             <a:endParaRPr lang="en-IN"/>
           </a:p>
@@ -12073,7 +12073,7 @@
             <a:fld id="{49F3E739-D457-46E5-B626-C9B182A007EE}" type="datetimeFigureOut">
               <a:rPr lang="en-US" smtClean="0"/>
               <a:pPr/>
-              <a:t>5/11/2023</a:t>
+              <a:t>5/12/2023</a:t>
             </a:fld>
             <a:endParaRPr lang="en-US"/>
           </a:p>
@@ -13072,7 +13072,7 @@
             <a:fld id="{49F3E739-D457-46E5-B626-C9B182A007EE}" type="datetimeFigureOut">
               <a:rPr lang="en-US" smtClean="0"/>
               <a:pPr/>
-              <a:t>5/11/2023</a:t>
+              <a:t>5/12/2023</a:t>
             </a:fld>
             <a:endParaRPr lang="en-US"/>
           </a:p>
@@ -14061,20 +14061,26 @@
           <a:p>
             <a:r>
               <a:rPr lang="en-US" dirty="0"/>
+              <a:t>Adapter container</a:t>
+            </a:r>
+          </a:p>
+          <a:p>
+            <a:r>
+              <a:rPr lang="en-US" dirty="0"/>
+              <a:t>Ambassador container</a:t>
+            </a:r>
+          </a:p>
+          <a:p>
+            <a:r>
+              <a:rPr lang="en-US" dirty="0"/>
               <a:t>Deploying application from Private repository</a:t>
             </a:r>
           </a:p>
           <a:p>
             <a:r>
               <a:rPr lang="en-US" dirty="0"/>
-              <a:t>resource allocation like CPU and MEMORY- CPU and Memory allocation</a:t>
+              <a:t>resource allocation like CPU and MEMORYCPU and Memory allocation</a:t>
             </a:r>
-          </a:p>
-          <a:p>
-            <a:pPr marL="914400" lvl="2" indent="0">
-              <a:buNone/>
-            </a:pPr>
-            <a:endParaRPr lang="en-US" dirty="0"/>
           </a:p>
           <a:p>
             <a:pPr marL="914400" lvl="2" indent="0">
@@ -14197,25 +14203,19 @@
         </p:nvSpPr>
         <p:spPr>
           <a:xfrm>
-            <a:off x="1154954" y="2561296"/>
-            <a:ext cx="9845981" cy="3416300"/>
+            <a:off x="0" y="2278505"/>
+            <a:ext cx="12192000" cy="4579495"/>
           </a:xfrm>
         </p:spPr>
         <p:txBody>
           <a:bodyPr>
-            <a:normAutofit fontScale="92500" lnSpcReduction="20000"/>
+            <a:normAutofit/>
           </a:bodyPr>
           <a:lstStyle/>
           <a:p>
             <a:r>
               <a:rPr lang="en-US" dirty="0"/>
-              <a:t>Refer resources and artifacts from k8s-resources</a:t>
-            </a:r>
-          </a:p>
-          <a:p>
-            <a:r>
-              <a:rPr lang="en-US" dirty="0"/>
-              <a:t>sidecar containers:</a:t>
+              <a:t>sidecar containers with use case and example:</a:t>
             </a:r>
           </a:p>
           <a:p>
@@ -14228,7 +14228,7 @@
           <a:p>
             <a:r>
               <a:rPr lang="en-US" dirty="0"/>
-              <a:t>sidecar containers pattern:</a:t>
+              <a:t>sidecar containers:</a:t>
             </a:r>
           </a:p>
           <a:p>
@@ -14241,6 +14241,32 @@
           <a:p>
             <a:r>
               <a:rPr lang="en-US" dirty="0"/>
+              <a:t>Adapter containers:</a:t>
+            </a:r>
+          </a:p>
+          <a:p>
+            <a:pPr lvl="1"/>
+            <a:r>
+              <a:rPr lang="en-US" dirty="0"/>
+              <a:t>https://medium.com/bb-tutorials-and-thoughts/kubernetes-learn-adaptor-container-pattern-97674285983c</a:t>
+            </a:r>
+          </a:p>
+          <a:p>
+            <a:r>
+              <a:rPr lang="en-US" dirty="0"/>
+              <a:t>Ambassador container pattern</a:t>
+            </a:r>
+          </a:p>
+          <a:p>
+            <a:pPr lvl="1"/>
+            <a:r>
+              <a:rPr lang="en-US" dirty="0"/>
+              <a:t>https://medium.com/bb-tutorials-and-thoughts/kubernetes-learn-ambassador-container-pattern-bc2e1331bd3a</a:t>
+            </a:r>
+          </a:p>
+          <a:p>
+            <a:r>
+              <a:rPr lang="en-US" dirty="0"/>
               <a:t>static pods:</a:t>
             </a:r>
           </a:p>
@@ -14256,27 +14282,6 @@
             <a:r>
               <a:rPr lang="en-US" dirty="0"/>
               <a:t>https://faun.pub/static-pods-in-kubernetes-29fe8063bf96</a:t>
-            </a:r>
-          </a:p>
-          <a:p>
-            <a:r>
-              <a:rPr lang="en-US" dirty="0"/>
-              <a:t>Static Pods and </a:t>
-            </a:r>
-            <a:r>
-              <a:rPr lang="en-US" dirty="0" err="1"/>
-              <a:t>Daemonset</a:t>
-            </a:r>
-            <a:r>
-              <a:rPr lang="en-US" dirty="0"/>
-              <a:t>:</a:t>
-            </a:r>
-          </a:p>
-          <a:p>
-            <a:pPr lvl="1"/>
-            <a:r>
-              <a:rPr lang="en-US" dirty="0"/>
-              <a:t>https://medium.com/google-cloud/daemon-sets-static-pods-bf43b10efe97</a:t>
             </a:r>
           </a:p>
         </p:txBody>

</xml_diff>